<commit_message>
GPIO Output tutorial content
</commit_message>
<xml_diff>
--- a/gsoc17/tutorial/Android_Things_GPIO_Output/movie_presentation.pptx
+++ b/gsoc17/tutorial/Android_Things_GPIO_Output/movie_presentation.pptx
@@ -14,6 +14,13 @@
     <p:sldId id="264" r:id="rId8"/>
     <p:sldId id="263" r:id="rId9"/>
     <p:sldId id="265" r:id="rId10"/>
+    <p:sldId id="266" r:id="rId11"/>
+    <p:sldId id="267" r:id="rId12"/>
+    <p:sldId id="268" r:id="rId13"/>
+    <p:sldId id="269" r:id="rId14"/>
+    <p:sldId id="270" r:id="rId15"/>
+    <p:sldId id="271" r:id="rId16"/>
+    <p:sldId id="272" r:id="rId17"/>
   </p:sldIdLst>
   <p:sldSz cx="9144000" cy="6858000" type="screen4x3"/>
   <p:notesSz cx="6858000" cy="9144000"/>
@@ -3210,6 +3217,737 @@
 </p:sld>
 </file>
 
+<file path=ppt/slides/slide10.xml><?xml version="1.0" encoding="utf-8"?>
+<p:sld xmlns:a="http://schemas.openxmlformats.org/drawingml/2006/main" xmlns:r="http://schemas.openxmlformats.org/officeDocument/2006/relationships" xmlns:p="http://schemas.openxmlformats.org/presentationml/2006/main">
+  <p:cSld>
+    <p:spTree>
+      <p:nvGrpSpPr>
+        <p:cNvPr id="1" name=""/>
+        <p:cNvGrpSpPr/>
+        <p:nvPr/>
+      </p:nvGrpSpPr>
+      <p:grpSpPr>
+        <a:xfrm>
+          <a:off x="0" y="0"/>
+          <a:ext cx="0" cy="0"/>
+          <a:chOff x="0" y="0"/>
+          <a:chExt cx="0" cy="0"/>
+        </a:xfrm>
+      </p:grpSpPr>
+      <p:sp>
+        <p:nvSpPr>
+          <p:cNvPr id="4" name="Title 3"/>
+          <p:cNvSpPr>
+            <a:spLocks noGrp="1"/>
+          </p:cNvSpPr>
+          <p:nvPr>
+            <p:ph type="ctrTitle"/>
+          </p:nvPr>
+        </p:nvSpPr>
+        <p:spPr/>
+        <p:txBody>
+          <a:bodyPr/>
+          <a:lstStyle/>
+          <a:p>
+            <a:r>
+              <a:rPr lang="en-US" dirty="0" smtClean="0"/>
+              <a:t>Create a sample project with On and Off Buttons.</a:t>
+            </a:r>
+            <a:endParaRPr lang="en-US" dirty="0"/>
+          </a:p>
+        </p:txBody>
+      </p:sp>
+      <p:sp>
+        <p:nvSpPr>
+          <p:cNvPr id="5" name="Subtitle 4"/>
+          <p:cNvSpPr>
+            <a:spLocks noGrp="1"/>
+          </p:cNvSpPr>
+          <p:nvPr>
+            <p:ph type="subTitle" idx="1"/>
+          </p:nvPr>
+        </p:nvSpPr>
+        <p:spPr/>
+        <p:txBody>
+          <a:bodyPr/>
+          <a:lstStyle/>
+          <a:p>
+            <a:r>
+              <a:rPr lang="en-US" dirty="0" smtClean="0"/>
+              <a:t>We will be using these buttons to control the LED in our circuit.</a:t>
+            </a:r>
+            <a:endParaRPr lang="en-US" dirty="0"/>
+          </a:p>
+        </p:txBody>
+      </p:sp>
+    </p:spTree>
+    <p:extLst>
+      <p:ext uri="{BB962C8B-B14F-4D97-AF65-F5344CB8AC3E}">
+        <p14:creationId xmlns:p14="http://schemas.microsoft.com/office/powerpoint/2010/main" val="2541693328"/>
+      </p:ext>
+    </p:extLst>
+  </p:cSld>
+  <p:clrMapOvr>
+    <a:masterClrMapping/>
+  </p:clrMapOvr>
+  <p:timing>
+    <p:tnLst>
+      <p:par>
+        <p:cTn xmlns:p14="http://schemas.microsoft.com/office/powerpoint/2010/main" id="1" dur="indefinite" restart="never" nodeType="tmRoot"/>
+      </p:par>
+    </p:tnLst>
+  </p:timing>
+</p:sld>
+</file>
+
+<file path=ppt/slides/slide11.xml><?xml version="1.0" encoding="utf-8"?>
+<p:sld xmlns:a="http://schemas.openxmlformats.org/drawingml/2006/main" xmlns:r="http://schemas.openxmlformats.org/officeDocument/2006/relationships" xmlns:p="http://schemas.openxmlformats.org/presentationml/2006/main">
+  <p:cSld>
+    <p:spTree>
+      <p:nvGrpSpPr>
+        <p:cNvPr id="1" name=""/>
+        <p:cNvGrpSpPr/>
+        <p:nvPr/>
+      </p:nvGrpSpPr>
+      <p:grpSpPr>
+        <a:xfrm>
+          <a:off x="0" y="0"/>
+          <a:ext cx="0" cy="0"/>
+          <a:chOff x="0" y="0"/>
+          <a:chExt cx="0" cy="0"/>
+        </a:xfrm>
+      </p:grpSpPr>
+      <p:sp>
+        <p:nvSpPr>
+          <p:cNvPr id="4" name="Title 3"/>
+          <p:cNvSpPr>
+            <a:spLocks noGrp="1"/>
+          </p:cNvSpPr>
+          <p:nvPr>
+            <p:ph type="ctrTitle"/>
+          </p:nvPr>
+        </p:nvSpPr>
+        <p:spPr/>
+        <p:txBody>
+          <a:bodyPr/>
+          <a:lstStyle/>
+          <a:p>
+            <a:r>
+              <a:rPr lang="en-US" dirty="0" smtClean="0"/>
+              <a:t>Configure the Android Things Components.</a:t>
+            </a:r>
+            <a:endParaRPr lang="en-US" dirty="0"/>
+          </a:p>
+        </p:txBody>
+      </p:sp>
+      <p:sp>
+        <p:nvSpPr>
+          <p:cNvPr id="5" name="Subtitle 4"/>
+          <p:cNvSpPr>
+            <a:spLocks noGrp="1"/>
+          </p:cNvSpPr>
+          <p:nvPr>
+            <p:ph type="subTitle" idx="1"/>
+          </p:nvPr>
+        </p:nvSpPr>
+        <p:spPr/>
+        <p:txBody>
+          <a:bodyPr/>
+          <a:lstStyle/>
+          <a:p>
+            <a:endParaRPr lang="en-US" dirty="0"/>
+          </a:p>
+        </p:txBody>
+      </p:sp>
+    </p:spTree>
+    <p:extLst>
+      <p:ext uri="{BB962C8B-B14F-4D97-AF65-F5344CB8AC3E}">
+        <p14:creationId xmlns:p14="http://schemas.microsoft.com/office/powerpoint/2010/main" val="3106570273"/>
+      </p:ext>
+    </p:extLst>
+  </p:cSld>
+  <p:clrMapOvr>
+    <a:masterClrMapping/>
+  </p:clrMapOvr>
+  <p:timing>
+    <p:tnLst>
+      <p:par>
+        <p:cTn xmlns:p14="http://schemas.microsoft.com/office/powerpoint/2010/main" id="1" dur="indefinite" restart="never" nodeType="tmRoot"/>
+      </p:par>
+    </p:tnLst>
+  </p:timing>
+</p:sld>
+</file>
+
+<file path=ppt/slides/slide12.xml><?xml version="1.0" encoding="utf-8"?>
+<p:sld xmlns:a="http://schemas.openxmlformats.org/drawingml/2006/main" xmlns:r="http://schemas.openxmlformats.org/officeDocument/2006/relationships" xmlns:p="http://schemas.openxmlformats.org/presentationml/2006/main">
+  <p:cSld>
+    <p:spTree>
+      <p:nvGrpSpPr>
+        <p:cNvPr id="1" name=""/>
+        <p:cNvGrpSpPr/>
+        <p:nvPr/>
+      </p:nvGrpSpPr>
+      <p:grpSpPr>
+        <a:xfrm>
+          <a:off x="0" y="0"/>
+          <a:ext cx="0" cy="0"/>
+          <a:chOff x="0" y="0"/>
+          <a:chExt cx="0" cy="0"/>
+        </a:xfrm>
+      </p:grpSpPr>
+      <p:sp>
+        <p:nvSpPr>
+          <p:cNvPr id="4" name="Title 3"/>
+          <p:cNvSpPr>
+            <a:spLocks noGrp="1"/>
+          </p:cNvSpPr>
+          <p:nvPr>
+            <p:ph type="title"/>
+          </p:nvPr>
+        </p:nvSpPr>
+        <p:spPr/>
+        <p:txBody>
+          <a:bodyPr/>
+          <a:lstStyle/>
+          <a:p>
+            <a:r>
+              <a:rPr lang="en-US" dirty="0" err="1" smtClean="0"/>
+              <a:t>AndroidThingsBoard</a:t>
+            </a:r>
+            <a:endParaRPr lang="en-US" dirty="0"/>
+          </a:p>
+        </p:txBody>
+      </p:sp>
+      <p:sp>
+        <p:nvSpPr>
+          <p:cNvPr id="5" name="Subtitle 4"/>
+          <p:cNvSpPr>
+            <a:spLocks noGrp="1"/>
+          </p:cNvSpPr>
+          <p:nvPr>
+            <p:ph idx="1"/>
+          </p:nvPr>
+        </p:nvSpPr>
+        <p:spPr/>
+        <p:txBody>
+          <a:bodyPr/>
+          <a:lstStyle/>
+          <a:p>
+            <a:r>
+              <a:rPr lang="en-US" dirty="0" smtClean="0"/>
+              <a:t>“Initialize”  method has to be called with the parameters given by your board in a previous step.</a:t>
+            </a:r>
+          </a:p>
+          <a:p>
+            <a:pPr lvl="1"/>
+            <a:r>
+              <a:rPr lang="en-US" dirty="0" smtClean="0"/>
+              <a:t>“identifier”: uniquely matches the messages sent to your board.</a:t>
+            </a:r>
+          </a:p>
+          <a:p>
+            <a:pPr lvl="1"/>
+            <a:r>
+              <a:rPr lang="en-US" dirty="0" smtClean="0"/>
+              <a:t>“</a:t>
+            </a:r>
+            <a:r>
+              <a:rPr lang="en-US" dirty="0" err="1" smtClean="0"/>
+              <a:t>hardwarePlatform</a:t>
+            </a:r>
+            <a:r>
+              <a:rPr lang="en-US" dirty="0" smtClean="0"/>
+              <a:t>”: the board type</a:t>
+            </a:r>
+          </a:p>
+          <a:p>
+            <a:pPr lvl="1"/>
+            <a:r>
+              <a:rPr lang="en-US" dirty="0" smtClean="0"/>
+              <a:t>“</a:t>
+            </a:r>
+            <a:r>
+              <a:rPr lang="en-US" dirty="0" err="1" smtClean="0"/>
+              <a:t>messagingHost</a:t>
+            </a:r>
+            <a:r>
+              <a:rPr lang="en-US" dirty="0" smtClean="0"/>
+              <a:t>” : the MQTT server address</a:t>
+            </a:r>
+          </a:p>
+          <a:p>
+            <a:pPr lvl="1"/>
+            <a:r>
+              <a:rPr lang="en-US" dirty="0" smtClean="0"/>
+              <a:t>“</a:t>
+            </a:r>
+            <a:r>
+              <a:rPr lang="en-US" dirty="0" err="1" smtClean="0"/>
+              <a:t>messagingPort</a:t>
+            </a:r>
+            <a:r>
+              <a:rPr lang="en-US" dirty="0" smtClean="0"/>
+              <a:t>” : the MQTT server port</a:t>
+            </a:r>
+          </a:p>
+        </p:txBody>
+      </p:sp>
+    </p:spTree>
+    <p:extLst>
+      <p:ext uri="{BB962C8B-B14F-4D97-AF65-F5344CB8AC3E}">
+        <p14:creationId xmlns:p14="http://schemas.microsoft.com/office/powerpoint/2010/main" val="3106570273"/>
+      </p:ext>
+    </p:extLst>
+  </p:cSld>
+  <p:clrMapOvr>
+    <a:masterClrMapping/>
+  </p:clrMapOvr>
+  <p:timing>
+    <p:tnLst>
+      <p:par>
+        <p:cTn xmlns:p14="http://schemas.microsoft.com/office/powerpoint/2010/main" id="1" dur="indefinite" restart="never" nodeType="tmRoot"/>
+      </p:par>
+    </p:tnLst>
+  </p:timing>
+</p:sld>
+</file>
+
+<file path=ppt/slides/slide13.xml><?xml version="1.0" encoding="utf-8"?>
+<p:sld xmlns:a="http://schemas.openxmlformats.org/drawingml/2006/main" xmlns:r="http://schemas.openxmlformats.org/officeDocument/2006/relationships" xmlns:p="http://schemas.openxmlformats.org/presentationml/2006/main">
+  <p:cSld>
+    <p:spTree>
+      <p:nvGrpSpPr>
+        <p:cNvPr id="1" name=""/>
+        <p:cNvGrpSpPr/>
+        <p:nvPr/>
+      </p:nvGrpSpPr>
+      <p:grpSpPr>
+        <a:xfrm>
+          <a:off x="0" y="0"/>
+          <a:ext cx="0" cy="0"/>
+          <a:chOff x="0" y="0"/>
+          <a:chExt cx="0" cy="0"/>
+        </a:xfrm>
+      </p:grpSpPr>
+      <p:sp>
+        <p:nvSpPr>
+          <p:cNvPr id="4" name="Title 3"/>
+          <p:cNvSpPr>
+            <a:spLocks noGrp="1"/>
+          </p:cNvSpPr>
+          <p:nvPr>
+            <p:ph type="title"/>
+          </p:nvPr>
+        </p:nvSpPr>
+        <p:spPr/>
+        <p:txBody>
+          <a:bodyPr/>
+          <a:lstStyle/>
+          <a:p>
+            <a:r>
+              <a:rPr lang="en-US" dirty="0" err="1" smtClean="0"/>
+              <a:t>AndroidThingsGPIO</a:t>
+            </a:r>
+            <a:endParaRPr lang="en-US" dirty="0"/>
+          </a:p>
+        </p:txBody>
+      </p:sp>
+      <p:sp>
+        <p:nvSpPr>
+          <p:cNvPr id="5" name="Subtitle 4"/>
+          <p:cNvSpPr>
+            <a:spLocks noGrp="1"/>
+          </p:cNvSpPr>
+          <p:nvPr>
+            <p:ph idx="1"/>
+          </p:nvPr>
+        </p:nvSpPr>
+        <p:spPr/>
+        <p:txBody>
+          <a:bodyPr>
+            <a:normAutofit lnSpcReduction="10000"/>
+          </a:bodyPr>
+          <a:lstStyle/>
+          <a:p>
+            <a:r>
+              <a:rPr lang="en-US" dirty="0" smtClean="0"/>
+              <a:t>“Register”  method has to be called before any target events or callbacks.</a:t>
+            </a:r>
+          </a:p>
+          <a:p>
+            <a:pPr lvl="1"/>
+            <a:r>
+              <a:rPr lang="en-US" dirty="0" smtClean="0"/>
+              <a:t>“</a:t>
+            </a:r>
+            <a:r>
+              <a:rPr lang="en-US" dirty="0" err="1" smtClean="0"/>
+              <a:t>pinName</a:t>
+            </a:r>
+            <a:r>
+              <a:rPr lang="en-US" dirty="0" smtClean="0"/>
+              <a:t>” : the name of the pin as designated in the </a:t>
+            </a:r>
+            <a:r>
+              <a:rPr lang="en-US" dirty="0" err="1" smtClean="0"/>
+              <a:t>PinOut</a:t>
+            </a:r>
+            <a:r>
+              <a:rPr lang="en-US" dirty="0" smtClean="0"/>
+              <a:t> diagram for your Android Things compatible board.</a:t>
+            </a:r>
+          </a:p>
+          <a:p>
+            <a:pPr lvl="1"/>
+            <a:r>
+              <a:rPr lang="en-US" dirty="0" smtClean="0"/>
+              <a:t>“</a:t>
+            </a:r>
+            <a:r>
+              <a:rPr lang="en-US" dirty="0" err="1" smtClean="0"/>
+              <a:t>isOutput</a:t>
+            </a:r>
+            <a:r>
+              <a:rPr lang="en-US" dirty="0" smtClean="0"/>
+              <a:t>” : the directionality of the pin, i.e. true indicates an output device such as an LED is attached.</a:t>
+            </a:r>
+          </a:p>
+          <a:p>
+            <a:pPr lvl="1"/>
+            <a:r>
+              <a:rPr lang="en-US" dirty="0" smtClean="0"/>
+              <a:t> “</a:t>
+            </a:r>
+            <a:r>
+              <a:rPr lang="en-US" dirty="0" err="1" smtClean="0"/>
+              <a:t>androidThingsBoard</a:t>
+            </a:r>
+            <a:r>
+              <a:rPr lang="en-US" dirty="0" smtClean="0"/>
+              <a:t>” : the board that this pin is part of.</a:t>
+            </a:r>
+            <a:endParaRPr lang="en-US" dirty="0"/>
+          </a:p>
+        </p:txBody>
+      </p:sp>
+    </p:spTree>
+    <p:extLst>
+      <p:ext uri="{BB962C8B-B14F-4D97-AF65-F5344CB8AC3E}">
+        <p14:creationId xmlns:p14="http://schemas.microsoft.com/office/powerpoint/2010/main" val="4289326797"/>
+      </p:ext>
+    </p:extLst>
+  </p:cSld>
+  <p:clrMapOvr>
+    <a:masterClrMapping/>
+  </p:clrMapOvr>
+  <p:timing>
+    <p:tnLst>
+      <p:par>
+        <p:cTn xmlns:p14="http://schemas.microsoft.com/office/powerpoint/2010/main" id="1" dur="indefinite" restart="never" nodeType="tmRoot"/>
+      </p:par>
+    </p:tnLst>
+  </p:timing>
+</p:sld>
+</file>
+
+<file path=ppt/slides/slide14.xml><?xml version="1.0" encoding="utf-8"?>
+<p:sld xmlns:a="http://schemas.openxmlformats.org/drawingml/2006/main" xmlns:r="http://schemas.openxmlformats.org/officeDocument/2006/relationships" xmlns:p="http://schemas.openxmlformats.org/presentationml/2006/main">
+  <p:cSld>
+    <p:spTree>
+      <p:nvGrpSpPr>
+        <p:cNvPr id="1" name=""/>
+        <p:cNvGrpSpPr/>
+        <p:nvPr/>
+      </p:nvGrpSpPr>
+      <p:grpSpPr>
+        <a:xfrm>
+          <a:off x="0" y="0"/>
+          <a:ext cx="0" cy="0"/>
+          <a:chOff x="0" y="0"/>
+          <a:chExt cx="0" cy="0"/>
+        </a:xfrm>
+      </p:grpSpPr>
+      <p:sp>
+        <p:nvSpPr>
+          <p:cNvPr id="4" name="Title 3"/>
+          <p:cNvSpPr>
+            <a:spLocks noGrp="1"/>
+          </p:cNvSpPr>
+          <p:nvPr>
+            <p:ph type="title"/>
+          </p:nvPr>
+        </p:nvSpPr>
+        <p:spPr/>
+        <p:txBody>
+          <a:bodyPr/>
+          <a:lstStyle/>
+          <a:p>
+            <a:r>
+              <a:rPr lang="en-US" dirty="0" smtClean="0"/>
+              <a:t>Buttons</a:t>
+            </a:r>
+            <a:endParaRPr lang="en-US" dirty="0"/>
+          </a:p>
+        </p:txBody>
+      </p:sp>
+      <p:sp>
+        <p:nvSpPr>
+          <p:cNvPr id="5" name="Subtitle 4"/>
+          <p:cNvSpPr>
+            <a:spLocks noGrp="1"/>
+          </p:cNvSpPr>
+          <p:nvPr>
+            <p:ph idx="1"/>
+          </p:nvPr>
+        </p:nvSpPr>
+        <p:spPr/>
+        <p:txBody>
+          <a:bodyPr>
+            <a:normAutofit/>
+          </a:bodyPr>
+          <a:lstStyle/>
+          <a:p>
+            <a:r>
+              <a:rPr lang="en-US" dirty="0" smtClean="0"/>
+              <a:t>“On” Click </a:t>
+            </a:r>
+            <a:r>
+              <a:rPr lang="en-US" dirty="0" smtClean="0">
+                <a:sym typeface="Wingdings"/>
+              </a:rPr>
+              <a:t> Pin state true (turn LED on)</a:t>
+            </a:r>
+          </a:p>
+          <a:p>
+            <a:endParaRPr lang="en-US" dirty="0" smtClean="0">
+              <a:sym typeface="Wingdings"/>
+            </a:endParaRPr>
+          </a:p>
+          <a:p>
+            <a:r>
+              <a:rPr lang="en-US" dirty="0" smtClean="0"/>
+              <a:t>“Off” </a:t>
+            </a:r>
+            <a:r>
+              <a:rPr lang="en-US" dirty="0"/>
+              <a:t>Click </a:t>
+            </a:r>
+            <a:r>
+              <a:rPr lang="en-US" dirty="0">
+                <a:sym typeface="Wingdings"/>
+              </a:rPr>
+              <a:t> Pin state </a:t>
+            </a:r>
+            <a:r>
+              <a:rPr lang="en-US" dirty="0" smtClean="0">
+                <a:sym typeface="Wingdings"/>
+              </a:rPr>
+              <a:t>false (</a:t>
+            </a:r>
+            <a:r>
+              <a:rPr lang="en-US">
+                <a:sym typeface="Wingdings"/>
+              </a:rPr>
+              <a:t>turn </a:t>
+            </a:r>
+            <a:r>
+              <a:rPr lang="en-US" smtClean="0">
+                <a:sym typeface="Wingdings"/>
+              </a:rPr>
+              <a:t>LED off</a:t>
+            </a:r>
+            <a:r>
+              <a:rPr lang="en-US" dirty="0" smtClean="0">
+                <a:sym typeface="Wingdings"/>
+              </a:rPr>
+              <a:t>)</a:t>
+            </a:r>
+            <a:endParaRPr lang="en-US" dirty="0"/>
+          </a:p>
+          <a:p>
+            <a:endParaRPr lang="en-US" dirty="0"/>
+          </a:p>
+        </p:txBody>
+      </p:sp>
+    </p:spTree>
+    <p:extLst>
+      <p:ext uri="{BB962C8B-B14F-4D97-AF65-F5344CB8AC3E}">
+        <p14:creationId xmlns:p14="http://schemas.microsoft.com/office/powerpoint/2010/main" val="3230020091"/>
+      </p:ext>
+    </p:extLst>
+  </p:cSld>
+  <p:clrMapOvr>
+    <a:masterClrMapping/>
+  </p:clrMapOvr>
+  <p:timing>
+    <p:tnLst>
+      <p:par>
+        <p:cTn xmlns:p14="http://schemas.microsoft.com/office/powerpoint/2010/main" id="1" dur="indefinite" restart="never" nodeType="tmRoot"/>
+      </p:par>
+    </p:tnLst>
+  </p:timing>
+</p:sld>
+</file>
+
+<file path=ppt/slides/slide15.xml><?xml version="1.0" encoding="utf-8"?>
+<p:sld xmlns:a="http://schemas.openxmlformats.org/drawingml/2006/main" xmlns:r="http://schemas.openxmlformats.org/officeDocument/2006/relationships" xmlns:p="http://schemas.openxmlformats.org/presentationml/2006/main">
+  <p:cSld>
+    <p:spTree>
+      <p:nvGrpSpPr>
+        <p:cNvPr id="1" name=""/>
+        <p:cNvGrpSpPr/>
+        <p:nvPr/>
+      </p:nvGrpSpPr>
+      <p:grpSpPr>
+        <a:xfrm>
+          <a:off x="0" y="0"/>
+          <a:ext cx="0" cy="0"/>
+          <a:chOff x="0" y="0"/>
+          <a:chExt cx="0" cy="0"/>
+        </a:xfrm>
+      </p:grpSpPr>
+      <p:sp>
+        <p:nvSpPr>
+          <p:cNvPr id="4" name="Title 3"/>
+          <p:cNvSpPr>
+            <a:spLocks noGrp="1"/>
+          </p:cNvSpPr>
+          <p:nvPr>
+            <p:ph type="ctrTitle"/>
+          </p:nvPr>
+        </p:nvSpPr>
+        <p:spPr/>
+        <p:txBody>
+          <a:bodyPr/>
+          <a:lstStyle/>
+          <a:p>
+            <a:r>
+              <a:rPr lang="en-US" dirty="0" smtClean="0"/>
+              <a:t>Complete App Inventor Program</a:t>
+            </a:r>
+            <a:endParaRPr lang="en-US" dirty="0"/>
+          </a:p>
+        </p:txBody>
+      </p:sp>
+      <p:sp>
+        <p:nvSpPr>
+          <p:cNvPr id="5" name="Subtitle 4"/>
+          <p:cNvSpPr>
+            <a:spLocks noGrp="1"/>
+          </p:cNvSpPr>
+          <p:nvPr>
+            <p:ph type="subTitle" idx="1"/>
+          </p:nvPr>
+        </p:nvSpPr>
+        <p:spPr/>
+        <p:txBody>
+          <a:bodyPr/>
+          <a:lstStyle/>
+          <a:p>
+            <a:endParaRPr lang="en-US" dirty="0"/>
+          </a:p>
+        </p:txBody>
+      </p:sp>
+    </p:spTree>
+    <p:extLst>
+      <p:ext uri="{BB962C8B-B14F-4D97-AF65-F5344CB8AC3E}">
+        <p14:creationId xmlns:p14="http://schemas.microsoft.com/office/powerpoint/2010/main" val="3141749528"/>
+      </p:ext>
+    </p:extLst>
+  </p:cSld>
+  <p:clrMapOvr>
+    <a:masterClrMapping/>
+  </p:clrMapOvr>
+  <p:timing>
+    <p:tnLst>
+      <p:par>
+        <p:cTn xmlns:p14="http://schemas.microsoft.com/office/powerpoint/2010/main" id="1" dur="indefinite" restart="never" nodeType="tmRoot"/>
+      </p:par>
+    </p:tnLst>
+  </p:timing>
+</p:sld>
+</file>
+
+<file path=ppt/slides/slide16.xml><?xml version="1.0" encoding="utf-8"?>
+<p:sld xmlns:a="http://schemas.openxmlformats.org/drawingml/2006/main" xmlns:r="http://schemas.openxmlformats.org/officeDocument/2006/relationships" xmlns:p="http://schemas.openxmlformats.org/presentationml/2006/main">
+  <p:cSld>
+    <p:spTree>
+      <p:nvGrpSpPr>
+        <p:cNvPr id="1" name=""/>
+        <p:cNvGrpSpPr/>
+        <p:nvPr/>
+      </p:nvGrpSpPr>
+      <p:grpSpPr>
+        <a:xfrm>
+          <a:off x="0" y="0"/>
+          <a:ext cx="0" cy="0"/>
+          <a:chOff x="0" y="0"/>
+          <a:chExt cx="0" cy="0"/>
+        </a:xfrm>
+      </p:grpSpPr>
+      <p:sp>
+        <p:nvSpPr>
+          <p:cNvPr id="4" name="Title 3"/>
+          <p:cNvSpPr>
+            <a:spLocks noGrp="1"/>
+          </p:cNvSpPr>
+          <p:nvPr>
+            <p:ph type="ctrTitle"/>
+          </p:nvPr>
+        </p:nvSpPr>
+        <p:spPr/>
+        <p:txBody>
+          <a:bodyPr/>
+          <a:lstStyle/>
+          <a:p>
+            <a:r>
+              <a:rPr lang="en-US" dirty="0" smtClean="0"/>
+              <a:t>Demo</a:t>
+            </a:r>
+            <a:endParaRPr lang="en-US" dirty="0"/>
+          </a:p>
+        </p:txBody>
+      </p:sp>
+      <p:sp>
+        <p:nvSpPr>
+          <p:cNvPr id="5" name="Subtitle 4"/>
+          <p:cNvSpPr>
+            <a:spLocks noGrp="1"/>
+          </p:cNvSpPr>
+          <p:nvPr>
+            <p:ph type="subTitle" idx="1"/>
+          </p:nvPr>
+        </p:nvSpPr>
+        <p:spPr/>
+        <p:txBody>
+          <a:bodyPr/>
+          <a:lstStyle/>
+          <a:p>
+            <a:endParaRPr lang="en-US" dirty="0"/>
+          </a:p>
+        </p:txBody>
+      </p:sp>
+    </p:spTree>
+    <p:extLst>
+      <p:ext uri="{BB962C8B-B14F-4D97-AF65-F5344CB8AC3E}">
+        <p14:creationId xmlns:p14="http://schemas.microsoft.com/office/powerpoint/2010/main" val="3453396433"/>
+      </p:ext>
+    </p:extLst>
+  </p:cSld>
+  <p:clrMapOvr>
+    <a:masterClrMapping/>
+  </p:clrMapOvr>
+  <p:timing>
+    <p:tnLst>
+      <p:par>
+        <p:cTn xmlns:p14="http://schemas.microsoft.com/office/powerpoint/2010/main" id="1" dur="indefinite" restart="never" nodeType="tmRoot"/>
+      </p:par>
+    </p:tnLst>
+  </p:timing>
+</p:sld>
+</file>
+
 <file path=ppt/slides/slide2.xml><?xml version="1.0" encoding="utf-8"?>
 <p:sld xmlns:a="http://schemas.openxmlformats.org/drawingml/2006/main" xmlns:r="http://schemas.openxmlformats.org/officeDocument/2006/relationships" xmlns:p="http://schemas.openxmlformats.org/presentationml/2006/main">
   <p:cSld>
@@ -4025,13 +4763,8 @@
           <a:p>
             <a:r>
               <a:rPr lang="en-US" dirty="0" smtClean="0"/>
-              <a:t>Upload the extension to </a:t>
-            </a:r>
-            <a:r>
-              <a:rPr lang="en-US" smtClean="0"/>
-              <a:t>your project</a:t>
-            </a:r>
-            <a:endParaRPr lang="en-US" dirty="0" smtClean="0"/>
+              <a:t>Upload the extension to your project</a:t>
+            </a:r>
           </a:p>
         </p:txBody>
       </p:sp>
@@ -4045,6 +4778,13 @@
   <p:clrMapOvr>
     <a:masterClrMapping/>
   </p:clrMapOvr>
+  <p:timing>
+    <p:tnLst>
+      <p:par>
+        <p:cTn xmlns:p14="http://schemas.microsoft.com/office/powerpoint/2010/main" id="1" dur="indefinite" restart="never" nodeType="tmRoot"/>
+      </p:par>
+    </p:tnLst>
+  </p:timing>
 </p:sld>
 </file>
 

</xml_diff>